<commit_message>
new stopwords, corrent write to file
</commit_message>
<xml_diff>
--- a/Slides/Mentor-mentee recommendation system.pptx
+++ b/Slides/Mentor-mentee recommendation system.pptx
@@ -2466,7 +2466,7 @@
           <a:p>
             <a:fld id="{77F6B3FA-A3F1-48CA-9C4E-05594C8264A4}" type="datetimeFigureOut">
               <a:rPr lang="fr-CH" smtClean="0"/>
-              <a:t>06.09.2017</a:t>
+              <a:t>19.09.2017</a:t>
             </a:fld>
             <a:endParaRPr lang="fr-CH"/>
           </a:p>
@@ -2762,7 +2762,7 @@
           <a:p>
             <a:fld id="{77F6B3FA-A3F1-48CA-9C4E-05594C8264A4}" type="datetimeFigureOut">
               <a:rPr lang="fr-CH" smtClean="0"/>
-              <a:t>06.09.2017</a:t>
+              <a:t>19.09.2017</a:t>
             </a:fld>
             <a:endParaRPr lang="fr-CH"/>
           </a:p>
@@ -3010,7 +3010,7 @@
           <a:p>
             <a:fld id="{77F6B3FA-A3F1-48CA-9C4E-05594C8264A4}" type="datetimeFigureOut">
               <a:rPr lang="fr-CH" smtClean="0"/>
-              <a:t>06.09.2017</a:t>
+              <a:t>19.09.2017</a:t>
             </a:fld>
             <a:endParaRPr lang="fr-CH"/>
           </a:p>
@@ -3550,7 +3550,7 @@
           <a:p>
             <a:fld id="{77F6B3FA-A3F1-48CA-9C4E-05594C8264A4}" type="datetimeFigureOut">
               <a:rPr lang="fr-CH" smtClean="0"/>
-              <a:t>06.09.2017</a:t>
+              <a:t>19.09.2017</a:t>
             </a:fld>
             <a:endParaRPr lang="fr-CH"/>
           </a:p>
@@ -3798,7 +3798,7 @@
           <a:p>
             <a:fld id="{77F6B3FA-A3F1-48CA-9C4E-05594C8264A4}" type="datetimeFigureOut">
               <a:rPr lang="fr-CH" smtClean="0"/>
-              <a:t>06.09.2017</a:t>
+              <a:t>19.09.2017</a:t>
             </a:fld>
             <a:endParaRPr lang="fr-CH"/>
           </a:p>
@@ -4330,7 +4330,7 @@
           <a:p>
             <a:fld id="{77F6B3FA-A3F1-48CA-9C4E-05594C8264A4}" type="datetimeFigureOut">
               <a:rPr lang="fr-CH" smtClean="0"/>
-              <a:t>06.09.2017</a:t>
+              <a:t>19.09.2017</a:t>
             </a:fld>
             <a:endParaRPr lang="fr-CH"/>
           </a:p>
@@ -4627,7 +4627,7 @@
           <a:p>
             <a:fld id="{77F6B3FA-A3F1-48CA-9C4E-05594C8264A4}" type="datetimeFigureOut">
               <a:rPr lang="fr-CH" smtClean="0"/>
-              <a:t>06.09.2017</a:t>
+              <a:t>19.09.2017</a:t>
             </a:fld>
             <a:endParaRPr lang="fr-CH"/>
           </a:p>
@@ -4801,7 +4801,7 @@
           <a:p>
             <a:fld id="{77F6B3FA-A3F1-48CA-9C4E-05594C8264A4}" type="datetimeFigureOut">
               <a:rPr lang="fr-CH" smtClean="0"/>
-              <a:t>06.09.2017</a:t>
+              <a:t>19.09.2017</a:t>
             </a:fld>
             <a:endParaRPr lang="fr-CH"/>
           </a:p>
@@ -4981,7 +4981,7 @@
           <a:p>
             <a:fld id="{77F6B3FA-A3F1-48CA-9C4E-05594C8264A4}" type="datetimeFigureOut">
               <a:rPr lang="fr-CH" smtClean="0"/>
-              <a:t>06.09.2017</a:t>
+              <a:t>19.09.2017</a:t>
             </a:fld>
             <a:endParaRPr lang="fr-CH"/>
           </a:p>
@@ -5151,7 +5151,7 @@
           <a:p>
             <a:fld id="{77F6B3FA-A3F1-48CA-9C4E-05594C8264A4}" type="datetimeFigureOut">
               <a:rPr lang="fr-CH" smtClean="0"/>
-              <a:t>06.09.2017</a:t>
+              <a:t>19.09.2017</a:t>
             </a:fld>
             <a:endParaRPr lang="fr-CH"/>
           </a:p>
@@ -5402,7 +5402,7 @@
           <a:p>
             <a:fld id="{77F6B3FA-A3F1-48CA-9C4E-05594C8264A4}" type="datetimeFigureOut">
               <a:rPr lang="fr-CH" smtClean="0"/>
-              <a:t>06.09.2017</a:t>
+              <a:t>19.09.2017</a:t>
             </a:fld>
             <a:endParaRPr lang="fr-CH"/>
           </a:p>
@@ -5699,7 +5699,7 @@
           <a:p>
             <a:fld id="{77F6B3FA-A3F1-48CA-9C4E-05594C8264A4}" type="datetimeFigureOut">
               <a:rPr lang="fr-CH" smtClean="0"/>
-              <a:t>06.09.2017</a:t>
+              <a:t>19.09.2017</a:t>
             </a:fld>
             <a:endParaRPr lang="fr-CH"/>
           </a:p>
@@ -6141,7 +6141,7 @@
           <a:p>
             <a:fld id="{77F6B3FA-A3F1-48CA-9C4E-05594C8264A4}" type="datetimeFigureOut">
               <a:rPr lang="fr-CH" smtClean="0"/>
-              <a:t>06.09.2017</a:t>
+              <a:t>19.09.2017</a:t>
             </a:fld>
             <a:endParaRPr lang="fr-CH"/>
           </a:p>
@@ -6259,7 +6259,7 @@
           <a:p>
             <a:fld id="{77F6B3FA-A3F1-48CA-9C4E-05594C8264A4}" type="datetimeFigureOut">
               <a:rPr lang="fr-CH" smtClean="0"/>
-              <a:t>06.09.2017</a:t>
+              <a:t>19.09.2017</a:t>
             </a:fld>
             <a:endParaRPr lang="fr-CH"/>
           </a:p>
@@ -6354,7 +6354,7 @@
           <a:p>
             <a:fld id="{77F6B3FA-A3F1-48CA-9C4E-05594C8264A4}" type="datetimeFigureOut">
               <a:rPr lang="fr-CH" smtClean="0"/>
-              <a:t>06.09.2017</a:t>
+              <a:t>19.09.2017</a:t>
             </a:fld>
             <a:endParaRPr lang="fr-CH"/>
           </a:p>
@@ -6637,7 +6637,7 @@
           <a:p>
             <a:fld id="{77F6B3FA-A3F1-48CA-9C4E-05594C8264A4}" type="datetimeFigureOut">
               <a:rPr lang="fr-CH" smtClean="0"/>
-              <a:t>06.09.2017</a:t>
+              <a:t>19.09.2017</a:t>
             </a:fld>
             <a:endParaRPr lang="fr-CH"/>
           </a:p>
@@ -6928,7 +6928,7 @@
           <a:p>
             <a:fld id="{77F6B3FA-A3F1-48CA-9C4E-05594C8264A4}" type="datetimeFigureOut">
               <a:rPr lang="fr-CH" smtClean="0"/>
-              <a:t>06.09.2017</a:t>
+              <a:t>19.09.2017</a:t>
             </a:fld>
             <a:endParaRPr lang="fr-CH"/>
           </a:p>
@@ -7458,7 +7458,7 @@
           <a:p>
             <a:fld id="{77F6B3FA-A3F1-48CA-9C4E-05594C8264A4}" type="datetimeFigureOut">
               <a:rPr lang="fr-CH" smtClean="0"/>
-              <a:t>06.09.2017</a:t>
+              <a:t>19.09.2017</a:t>
             </a:fld>
             <a:endParaRPr lang="fr-CH"/>
           </a:p>
@@ -8333,15 +8333,7 @@
                   <a:srgbClr val="0070C0"/>
                 </a:solidFill>
               </a:rPr>
-              <a:t>Method 2: </a:t>
-            </a:r>
-            <a:r>
-              <a:rPr lang="fr-CH" sz="3200" dirty="0">
-                <a:solidFill>
-                  <a:srgbClr val="0070C0"/>
-                </a:solidFill>
-              </a:rPr>
-              <a:t>LDA</a:t>
+              <a:t>Method 2: LDA</a:t>
             </a:r>
           </a:p>
         </p:txBody>
@@ -8583,15 +8575,7 @@
                   <a:srgbClr val="0070C0"/>
                 </a:solidFill>
               </a:rPr>
-              <a:t>Method 2: </a:t>
-            </a:r>
-            <a:r>
-              <a:rPr lang="fr-CH" sz="3200" dirty="0">
-                <a:solidFill>
-                  <a:srgbClr val="0070C0"/>
-                </a:solidFill>
-              </a:rPr>
-              <a:t>LDA </a:t>
+              <a:t>Method 2: LDA </a:t>
             </a:r>
             <a:r>
               <a:rPr lang="fr-CH" sz="3200" dirty="0" err="1">
@@ -8820,15 +8804,7 @@
                   <a:srgbClr val="0070C0"/>
                 </a:solidFill>
               </a:rPr>
-              <a:t>Method 2: </a:t>
-            </a:r>
-            <a:r>
-              <a:rPr lang="fr-CH" sz="3200" dirty="0">
-                <a:solidFill>
-                  <a:srgbClr val="0070C0"/>
-                </a:solidFill>
-              </a:rPr>
-              <a:t>LDA Topics</a:t>
+              <a:t>Method 2: LDA Topics</a:t>
             </a:r>
           </a:p>
         </p:txBody>
@@ -9508,7 +9484,7 @@
           <a:p>
             <a:r>
               <a:rPr lang="fr-CH" dirty="0" err="1"/>
-              <a:t>Clastering</a:t>
+              <a:t>Clustering</a:t>
             </a:r>
             <a:r>
               <a:rPr lang="fr-CH" dirty="0"/>
@@ -10120,11 +10096,6 @@
               </a:rPr>
               <a:t>Mentor description: Enron emails</a:t>
             </a:r>
-            <a:endParaRPr lang="fr-CH" dirty="0">
-              <a:solidFill>
-                <a:srgbClr val="0070C0"/>
-              </a:solidFill>
-            </a:endParaRPr>
           </a:p>
         </p:txBody>
       </p:sp>
@@ -10186,15 +10157,7 @@
                   <a:srgbClr val="0070C0"/>
                 </a:solidFill>
               </a:rPr>
-              <a:t>Mentor description: </a:t>
-            </a:r>
-            <a:r>
-              <a:rPr lang="fr-CH" sz="3200" dirty="0">
-                <a:solidFill>
-                  <a:srgbClr val="0070C0"/>
-                </a:solidFill>
-              </a:rPr>
-              <a:t>Topics of Enron emails</a:t>
+              <a:t>Mentor description: Topics of Enron emails</a:t>
             </a:r>
           </a:p>
         </p:txBody>

</xml_diff>